<commit_message>
Correct minor issue in slides
</commit_message>
<xml_diff>
--- a/learn-javascript-in-an-hour.pptx
+++ b/learn-javascript-in-an-hour.pptx
@@ -9894,7 +9894,7 @@
           <p:nvPr>
             <p:extLst>
               <p:ext uri="{D42A27DB-BD31-4B8C-83A1-F6EECF244321}">
-                <p14:modId xmlns:p14="http://schemas.microsoft.com/office/powerpoint/2010/main" val="3895108712"/>
+                <p14:modId xmlns:p14="http://schemas.microsoft.com/office/powerpoint/2010/main" val="4120494391"/>
               </p:ext>
             </p:extLst>
           </p:nvPr>
@@ -11657,7 +11657,7 @@
                         <a:t>geneID</a:t>
                       </a:r>
                       <a:r>
-                        <a:rPr lang="en-US" sz="1400" dirty="0">
+                        <a:rPr lang="en-US" sz="1400" dirty="0" smtClean="0">
                           <a:solidFill>
                             <a:srgbClr val="333333"/>
                           </a:solidFill>
@@ -11667,27 +11667,17 @@
                         <a:t>].</a:t>
                       </a:r>
                       <a:r>
-                        <a:rPr lang="en-US" sz="1400" dirty="0" err="1">
-                          <a:solidFill>
-                            <a:srgbClr val="333333"/>
-                          </a:solidFill>
-                          <a:effectLst/>
-                          <a:latin typeface="Consolas" panose="020B0609020204030204" pitchFamily="49" charset="0"/>
-                        </a:rPr>
-                        <a:t>locationhist</a:t>
-                      </a:r>
-                      <a:r>
-                        <a:rPr lang="en-US" sz="1400" dirty="0">
-                          <a:solidFill>
-                            <a:srgbClr val="333333"/>
-                          </a:solidFill>
-                          <a:effectLst/>
-                          <a:latin typeface="Consolas" panose="020B0609020204030204" pitchFamily="49" charset="0"/>
-                        </a:rPr>
-                        <a:t>[</a:t>
-                      </a:r>
-                      <a:r>
-                        <a:rPr lang="en-US" sz="1400" dirty="0">
+                        <a:rPr lang="en-US" sz="1400" smtClean="0">
+                          <a:solidFill>
+                            <a:srgbClr val="333333"/>
+                          </a:solidFill>
+                          <a:effectLst/>
+                          <a:latin typeface="Consolas" panose="020B0609020204030204" pitchFamily="49" charset="0"/>
+                        </a:rPr>
+                        <a:t>genomicinfo[</a:t>
+                      </a:r>
+                      <a:r>
+                        <a:rPr lang="en-US" sz="1400" smtClean="0">
                           <a:solidFill>
                             <a:srgbClr val="0086B3"/>
                           </a:solidFill>

</xml_diff>

<commit_message>
Link slides to GitHub repo
</commit_message>
<xml_diff>
--- a/learn-javascript-in-an-hour.pptx
+++ b/learn-javascript-in-an-hour.pptx
@@ -221,7 +221,7 @@
           <a:p>
             <a:fld id="{1104F152-7BA3-461A-A0A5-128A64E946FC}" type="datetimeFigureOut">
               <a:rPr lang="en-US" smtClean="0"/>
-              <a:t>12/5/2016</a:t>
+              <a:t>12/7/2016</a:t>
             </a:fld>
             <a:endParaRPr lang="en-US"/>
           </a:p>
@@ -1258,11 +1258,7 @@
           <a:p>
             <a:r>
               <a:rPr lang="en-US" dirty="0" smtClean="0"/>
-              <a:t>https://</a:t>
-            </a:r>
-            <a:r>
-              <a:rPr lang="en-US" dirty="0" smtClean="0"/>
-              <a:t>google.github.io/styleguide/jsguide.html</a:t>
+              <a:t>https://google.github.io/styleguide/jsguide.html</a:t>
             </a:r>
             <a:endParaRPr lang="en-US" baseline="0" dirty="0" smtClean="0"/>
           </a:p>
@@ -2290,7 +2286,7 @@
           <a:p>
             <a:fld id="{5619B8F2-FCA7-475B-ADE2-0EA77805432B}" type="datetimeFigureOut">
               <a:rPr lang="en-US" smtClean="0"/>
-              <a:t>12/5/2016</a:t>
+              <a:t>12/7/2016</a:t>
             </a:fld>
             <a:endParaRPr lang="en-US"/>
           </a:p>
@@ -2460,7 +2456,7 @@
           <a:p>
             <a:fld id="{5619B8F2-FCA7-475B-ADE2-0EA77805432B}" type="datetimeFigureOut">
               <a:rPr lang="en-US" smtClean="0"/>
-              <a:t>12/5/2016</a:t>
+              <a:t>12/7/2016</a:t>
             </a:fld>
             <a:endParaRPr lang="en-US"/>
           </a:p>
@@ -2640,7 +2636,7 @@
           <a:p>
             <a:fld id="{5619B8F2-FCA7-475B-ADE2-0EA77805432B}" type="datetimeFigureOut">
               <a:rPr lang="en-US" smtClean="0"/>
-              <a:t>12/5/2016</a:t>
+              <a:t>12/7/2016</a:t>
             </a:fld>
             <a:endParaRPr lang="en-US"/>
           </a:p>
@@ -2810,7 +2806,7 @@
           <a:p>
             <a:fld id="{5619B8F2-FCA7-475B-ADE2-0EA77805432B}" type="datetimeFigureOut">
               <a:rPr lang="en-US" smtClean="0"/>
-              <a:t>12/5/2016</a:t>
+              <a:t>12/7/2016</a:t>
             </a:fld>
             <a:endParaRPr lang="en-US"/>
           </a:p>
@@ -3056,7 +3052,7 @@
           <a:p>
             <a:fld id="{5619B8F2-FCA7-475B-ADE2-0EA77805432B}" type="datetimeFigureOut">
               <a:rPr lang="en-US" smtClean="0"/>
-              <a:t>12/5/2016</a:t>
+              <a:t>12/7/2016</a:t>
             </a:fld>
             <a:endParaRPr lang="en-US"/>
           </a:p>
@@ -3288,7 +3284,7 @@
           <a:p>
             <a:fld id="{5619B8F2-FCA7-475B-ADE2-0EA77805432B}" type="datetimeFigureOut">
               <a:rPr lang="en-US" smtClean="0"/>
-              <a:t>12/5/2016</a:t>
+              <a:t>12/7/2016</a:t>
             </a:fld>
             <a:endParaRPr lang="en-US"/>
           </a:p>
@@ -3655,7 +3651,7 @@
           <a:p>
             <a:fld id="{5619B8F2-FCA7-475B-ADE2-0EA77805432B}" type="datetimeFigureOut">
               <a:rPr lang="en-US" smtClean="0"/>
-              <a:t>12/5/2016</a:t>
+              <a:t>12/7/2016</a:t>
             </a:fld>
             <a:endParaRPr lang="en-US"/>
           </a:p>
@@ -3773,7 +3769,7 @@
           <a:p>
             <a:fld id="{5619B8F2-FCA7-475B-ADE2-0EA77805432B}" type="datetimeFigureOut">
               <a:rPr lang="en-US" smtClean="0"/>
-              <a:t>12/5/2016</a:t>
+              <a:t>12/7/2016</a:t>
             </a:fld>
             <a:endParaRPr lang="en-US"/>
           </a:p>
@@ -3868,7 +3864,7 @@
           <a:p>
             <a:fld id="{5619B8F2-FCA7-475B-ADE2-0EA77805432B}" type="datetimeFigureOut">
               <a:rPr lang="en-US" smtClean="0"/>
-              <a:t>12/5/2016</a:t>
+              <a:t>12/7/2016</a:t>
             </a:fld>
             <a:endParaRPr lang="en-US"/>
           </a:p>
@@ -4145,7 +4141,7 @@
           <a:p>
             <a:fld id="{5619B8F2-FCA7-475B-ADE2-0EA77805432B}" type="datetimeFigureOut">
               <a:rPr lang="en-US" smtClean="0"/>
-              <a:t>12/5/2016</a:t>
+              <a:t>12/7/2016</a:t>
             </a:fld>
             <a:endParaRPr lang="en-US"/>
           </a:p>
@@ -4398,7 +4394,7 @@
           <a:p>
             <a:fld id="{5619B8F2-FCA7-475B-ADE2-0EA77805432B}" type="datetimeFigureOut">
               <a:rPr lang="en-US" smtClean="0"/>
-              <a:t>12/5/2016</a:t>
+              <a:t>12/7/2016</a:t>
             </a:fld>
             <a:endParaRPr lang="en-US"/>
           </a:p>
@@ -4611,7 +4607,7 @@
           <a:p>
             <a:fld id="{5619B8F2-FCA7-475B-ADE2-0EA77805432B}" type="datetimeFigureOut">
               <a:rPr lang="en-US" smtClean="0"/>
-              <a:t>12/5/2016</a:t>
+              <a:t>12/7/2016</a:t>
             </a:fld>
             <a:endParaRPr lang="en-US"/>
           </a:p>
@@ -5052,12 +5048,12 @@
         <p:spPr>
           <a:xfrm>
             <a:off x="1524000" y="3602038"/>
-            <a:ext cx="9144000" cy="2504294"/>
+            <a:ext cx="9144000" cy="3134938"/>
           </a:xfrm>
         </p:spPr>
         <p:txBody>
           <a:bodyPr>
-            <a:normAutofit/>
+            <a:normAutofit fontScale="92500" lnSpcReduction="10000"/>
           </a:bodyPr>
           <a:lstStyle/>
           <a:p>
@@ -5086,7 +5082,6 @@
               <a:rPr lang="en-US" dirty="0" smtClean="0"/>
               <a:t>Meric</a:t>
             </a:r>
-            <a:endParaRPr lang="en-US" dirty="0" smtClean="0"/>
           </a:p>
           <a:p>
             <a:r>
@@ -5097,7 +5092,32 @@
           <a:p>
             <a:r>
               <a:rPr lang="en-US" dirty="0" smtClean="0"/>
-              <a:t>December 7, 2016</a:t>
+              <a:t>December 7, </a:t>
+            </a:r>
+            <a:r>
+              <a:rPr lang="en-US" dirty="0" smtClean="0"/>
+              <a:t>2016</a:t>
+            </a:r>
+          </a:p>
+          <a:p>
+            <a:endParaRPr lang="en-US" dirty="0"/>
+          </a:p>
+          <a:p>
+            <a:r>
+              <a:rPr lang="en-US" dirty="0">
+                <a:hlinkClick r:id="rId2"/>
+              </a:rPr>
+              <a:t>https://</a:t>
+            </a:r>
+            <a:r>
+              <a:rPr lang="en-US" dirty="0" smtClean="0">
+                <a:hlinkClick r:id="rId2"/>
+              </a:rPr>
+              <a:t>github.com/eweitz/hour-of-code-at-nih</a:t>
+            </a:r>
+            <a:r>
+              <a:rPr lang="en-US" dirty="0" smtClean="0"/>
+              <a:t> </a:t>
             </a:r>
             <a:endParaRPr lang="en-US" dirty="0"/>
           </a:p>
@@ -6171,11 +6191,7 @@
           <a:p>
             <a:r>
               <a:rPr lang="en-US" b="1" dirty="0" smtClean="0"/>
-              <a:t>Logical </a:t>
-            </a:r>
-            <a:r>
-              <a:rPr lang="en-US" b="1" dirty="0" smtClean="0"/>
-              <a:t>operators</a:t>
+              <a:t>Logical operators</a:t>
             </a:r>
             <a:endParaRPr lang="en-US" b="1" dirty="0"/>
           </a:p>
@@ -14700,11 +14716,7 @@
             </a:pPr>
             <a:r>
               <a:rPr lang="en-US" dirty="0" smtClean="0"/>
-              <a:t>Eric </a:t>
-            </a:r>
-            <a:r>
-              <a:rPr lang="en-US" dirty="0" smtClean="0"/>
-              <a:t>Weitz, NIH/NLM/NCBI</a:t>
+              <a:t>Eric Weitz, NIH/NLM/NCBI</a:t>
             </a:r>
           </a:p>
           <a:p>
@@ -14863,30 +14875,17 @@
           <a:p>
             <a:r>
               <a:rPr lang="en-US" dirty="0" smtClean="0"/>
-              <a:t>Learn </a:t>
-            </a:r>
+              <a:t>Learn JavaScript syntax and concepts</a:t>
+            </a:r>
+          </a:p>
+          <a:p>
+            <a:endParaRPr lang="en-US" dirty="0"/>
+          </a:p>
+          <a:p>
             <a:r>
               <a:rPr lang="en-US" dirty="0" smtClean="0"/>
-              <a:t>JavaScript </a:t>
-            </a:r>
-            <a:r>
-              <a:rPr lang="en-US" dirty="0" smtClean="0"/>
-              <a:t>syntax and concepts</a:t>
-            </a:r>
-          </a:p>
-          <a:p>
-            <a:endParaRPr lang="en-US" dirty="0"/>
-          </a:p>
-          <a:p>
-            <a:r>
-              <a:rPr lang="en-US" dirty="0" smtClean="0"/>
-              <a:t>Develop a web application for </a:t>
-            </a:r>
-            <a:r>
-              <a:rPr lang="en-US" dirty="0" smtClean="0"/>
-              <a:t>genomics</a:t>
-            </a:r>
-            <a:endParaRPr lang="en-US" dirty="0" smtClean="0"/>
+              <a:t>Develop a web application for genomics</a:t>
+            </a:r>
           </a:p>
           <a:p>
             <a:pPr marL="0" indent="0">
@@ -15118,11 +15117,7 @@
             </a:r>
             <a:r>
               <a:rPr lang="en-US" b="1" dirty="0" smtClean="0"/>
-              <a:t>ariable </a:t>
-            </a:r>
-            <a:r>
-              <a:rPr lang="en-US" b="1" dirty="0" smtClean="0"/>
-              <a:t>declaration and assignment</a:t>
+              <a:t>ariable declaration and assignment</a:t>
             </a:r>
             <a:endParaRPr lang="en-US" b="1" dirty="0"/>
           </a:p>

</xml_diff>

<commit_message>
Add email, fix typo, notes
</commit_message>
<xml_diff>
--- a/learn-javascript-in-an-hour.pptx
+++ b/learn-javascript-in-an-hour.pptx
@@ -221,7 +221,7 @@
           <a:p>
             <a:fld id="{1104F152-7BA3-461A-A0A5-128A64E946FC}" type="datetimeFigureOut">
               <a:rPr lang="en-US" smtClean="0"/>
-              <a:t>12/7/2016</a:t>
+              <a:t>12/7/16</a:t>
             </a:fld>
             <a:endParaRPr lang="en-US"/>
           </a:p>
@@ -1897,23 +1897,11 @@
             </a:r>
             <a:r>
               <a:rPr lang="en-US" b="0" baseline="0" dirty="0" smtClean="0"/>
-              <a:t> we can modify its properties.  In other words, although we cannot reassign </a:t>
-            </a:r>
-            <a:r>
-              <a:rPr lang="en-US" b="0" baseline="0" dirty="0" err="1" smtClean="0"/>
-              <a:t>genomicLocation</a:t>
+              <a:t> we can modify its properties</a:t>
             </a:r>
             <a:r>
               <a:rPr lang="en-US" b="0" baseline="0" dirty="0" smtClean="0"/>
-              <a:t> here, we can add, remove, or update its properties like ‘start’, ‘stop’, and our new property ‘</a:t>
-            </a:r>
-            <a:r>
-              <a:rPr lang="en-US" b="0" baseline="0" dirty="0" err="1" smtClean="0"/>
-              <a:t>assemblyAccVer</a:t>
-            </a:r>
-            <a:r>
-              <a:rPr lang="en-US" b="0" baseline="0" dirty="0" smtClean="0"/>
-              <a:t>’.</a:t>
+              <a:t>.</a:t>
             </a:r>
             <a:endParaRPr lang="en-US" b="1" dirty="0"/>
           </a:p>
@@ -2286,7 +2274,7 @@
           <a:p>
             <a:fld id="{5619B8F2-FCA7-475B-ADE2-0EA77805432B}" type="datetimeFigureOut">
               <a:rPr lang="en-US" smtClean="0"/>
-              <a:t>12/7/2016</a:t>
+              <a:t>12/7/16</a:t>
             </a:fld>
             <a:endParaRPr lang="en-US"/>
           </a:p>
@@ -2456,7 +2444,7 @@
           <a:p>
             <a:fld id="{5619B8F2-FCA7-475B-ADE2-0EA77805432B}" type="datetimeFigureOut">
               <a:rPr lang="en-US" smtClean="0"/>
-              <a:t>12/7/2016</a:t>
+              <a:t>12/7/16</a:t>
             </a:fld>
             <a:endParaRPr lang="en-US"/>
           </a:p>
@@ -2636,7 +2624,7 @@
           <a:p>
             <a:fld id="{5619B8F2-FCA7-475B-ADE2-0EA77805432B}" type="datetimeFigureOut">
               <a:rPr lang="en-US" smtClean="0"/>
-              <a:t>12/7/2016</a:t>
+              <a:t>12/7/16</a:t>
             </a:fld>
             <a:endParaRPr lang="en-US"/>
           </a:p>
@@ -2806,7 +2794,7 @@
           <a:p>
             <a:fld id="{5619B8F2-FCA7-475B-ADE2-0EA77805432B}" type="datetimeFigureOut">
               <a:rPr lang="en-US" smtClean="0"/>
-              <a:t>12/7/2016</a:t>
+              <a:t>12/7/16</a:t>
             </a:fld>
             <a:endParaRPr lang="en-US"/>
           </a:p>
@@ -3052,7 +3040,7 @@
           <a:p>
             <a:fld id="{5619B8F2-FCA7-475B-ADE2-0EA77805432B}" type="datetimeFigureOut">
               <a:rPr lang="en-US" smtClean="0"/>
-              <a:t>12/7/2016</a:t>
+              <a:t>12/7/16</a:t>
             </a:fld>
             <a:endParaRPr lang="en-US"/>
           </a:p>
@@ -3284,7 +3272,7 @@
           <a:p>
             <a:fld id="{5619B8F2-FCA7-475B-ADE2-0EA77805432B}" type="datetimeFigureOut">
               <a:rPr lang="en-US" smtClean="0"/>
-              <a:t>12/7/2016</a:t>
+              <a:t>12/7/16</a:t>
             </a:fld>
             <a:endParaRPr lang="en-US"/>
           </a:p>
@@ -3651,7 +3639,7 @@
           <a:p>
             <a:fld id="{5619B8F2-FCA7-475B-ADE2-0EA77805432B}" type="datetimeFigureOut">
               <a:rPr lang="en-US" smtClean="0"/>
-              <a:t>12/7/2016</a:t>
+              <a:t>12/7/16</a:t>
             </a:fld>
             <a:endParaRPr lang="en-US"/>
           </a:p>
@@ -3769,7 +3757,7 @@
           <a:p>
             <a:fld id="{5619B8F2-FCA7-475B-ADE2-0EA77805432B}" type="datetimeFigureOut">
               <a:rPr lang="en-US" smtClean="0"/>
-              <a:t>12/7/2016</a:t>
+              <a:t>12/7/16</a:t>
             </a:fld>
             <a:endParaRPr lang="en-US"/>
           </a:p>
@@ -3864,7 +3852,7 @@
           <a:p>
             <a:fld id="{5619B8F2-FCA7-475B-ADE2-0EA77805432B}" type="datetimeFigureOut">
               <a:rPr lang="en-US" smtClean="0"/>
-              <a:t>12/7/2016</a:t>
+              <a:t>12/7/16</a:t>
             </a:fld>
             <a:endParaRPr lang="en-US"/>
           </a:p>
@@ -4141,7 +4129,7 @@
           <a:p>
             <a:fld id="{5619B8F2-FCA7-475B-ADE2-0EA77805432B}" type="datetimeFigureOut">
               <a:rPr lang="en-US" smtClean="0"/>
-              <a:t>12/7/2016</a:t>
+              <a:t>12/7/16</a:t>
             </a:fld>
             <a:endParaRPr lang="en-US"/>
           </a:p>
@@ -4394,7 +4382,7 @@
           <a:p>
             <a:fld id="{5619B8F2-FCA7-475B-ADE2-0EA77805432B}" type="datetimeFigureOut">
               <a:rPr lang="en-US" smtClean="0"/>
-              <a:t>12/7/2016</a:t>
+              <a:t>12/7/16</a:t>
             </a:fld>
             <a:endParaRPr lang="en-US"/>
           </a:p>
@@ -4607,7 +4595,7 @@
           <a:p>
             <a:fld id="{5619B8F2-FCA7-475B-ADE2-0EA77805432B}" type="datetimeFigureOut">
               <a:rPr lang="en-US" smtClean="0"/>
-              <a:t>12/7/2016</a:t>
+              <a:t>12/7/16</a:t>
             </a:fld>
             <a:endParaRPr lang="en-US"/>
           </a:p>
@@ -5092,11 +5080,7 @@
           <a:p>
             <a:r>
               <a:rPr lang="en-US" dirty="0" smtClean="0"/>
-              <a:t>December 7, </a:t>
-            </a:r>
-            <a:r>
-              <a:rPr lang="en-US" dirty="0" smtClean="0"/>
-              <a:t>2016</a:t>
+              <a:t>December 7, 2016</a:t>
             </a:r>
           </a:p>
           <a:p>
@@ -5192,7 +5176,7 @@
           <p:nvPr>
             <p:extLst>
               <p:ext uri="{D42A27DB-BD31-4B8C-83A1-F6EECF244321}">
-                <p14:modId xmlns:p14="http://schemas.microsoft.com/office/powerpoint/2010/main" val="3543297552"/>
+                <p14:modId xmlns:p14="http://schemas.microsoft.com/office/powerpoint/2010/main" val="1818685932"/>
               </p:ext>
             </p:extLst>
           </p:nvPr>
@@ -8534,7 +8518,7 @@
           <p:nvPr>
             <p:extLst>
               <p:ext uri="{D42A27DB-BD31-4B8C-83A1-F6EECF244321}">
-                <p14:modId xmlns:p14="http://schemas.microsoft.com/office/powerpoint/2010/main" val="2619143145"/>
+                <p14:modId xmlns:p14="http://schemas.microsoft.com/office/powerpoint/2010/main" val="395802827"/>
               </p:ext>
             </p:extLst>
           </p:nvPr>
@@ -9097,7 +9081,7 @@
                         <a:t>'?</a:t>
                       </a:r>
                       <a:r>
-                        <a:rPr lang="en-US" sz="1800" dirty="0" err="1">
+                        <a:rPr lang="en-US" sz="1800" dirty="0" err="1" smtClean="0">
                           <a:solidFill>
                             <a:srgbClr val="183691"/>
                           </a:solidFill>
@@ -9107,7 +9091,7 @@
                         <a:t>retmode</a:t>
                       </a:r>
                       <a:r>
-                        <a:rPr lang="en-US" sz="1800" dirty="0">
+                        <a:rPr lang="en-US" sz="1800" dirty="0" smtClean="0">
                           <a:solidFill>
                             <a:srgbClr val="183691"/>
                           </a:solidFill>
@@ -9117,7 +9101,7 @@
                         <a:t>=</a:t>
                       </a:r>
                       <a:r>
-                        <a:rPr lang="en-US" sz="1800" dirty="0" err="1">
+                        <a:rPr lang="en-US" sz="1800" dirty="0" err="1" smtClean="0">
                           <a:solidFill>
                             <a:srgbClr val="183691"/>
                           </a:solidFill>
@@ -9127,17 +9111,57 @@
                         <a:t>json&amp;db</a:t>
                       </a:r>
                       <a:r>
-                        <a:rPr lang="en-US" sz="1800" dirty="0">
+                        <a:rPr lang="en-US" sz="1800" dirty="0" smtClean="0">
                           <a:solidFill>
                             <a:srgbClr val="183691"/>
                           </a:solidFill>
                           <a:effectLst/>
                           <a:latin typeface="Consolas" panose="020B0609020204030204" pitchFamily="49" charset="0"/>
                         </a:rPr>
-                        <a:t>=gene'</a:t>
-                      </a:r>
-                      <a:r>
-                        <a:rPr lang="en-US" sz="1800" dirty="0">
+                        <a:t>=</a:t>
+                      </a:r>
+                      <a:r>
+                        <a:rPr lang="en-US" sz="1800" dirty="0" err="1" smtClean="0">
+                          <a:solidFill>
+                            <a:srgbClr val="183691"/>
+                          </a:solidFill>
+                          <a:effectLst/>
+                          <a:latin typeface="Consolas" panose="020B0609020204030204" pitchFamily="49" charset="0"/>
+                        </a:rPr>
+                        <a:t>gene&amp;email</a:t>
+                      </a:r>
+                      <a:r>
+                        <a:rPr lang="en-US" sz="1800" dirty="0" smtClean="0">
+                          <a:solidFill>
+                            <a:srgbClr val="183691"/>
+                          </a:solidFill>
+                          <a:effectLst/>
+                          <a:latin typeface="Consolas" panose="020B0609020204030204" pitchFamily="49" charset="0"/>
+                        </a:rPr>
+                        <a:t>=</a:t>
+                      </a:r>
+                      <a:r>
+                        <a:rPr lang="en-US" sz="1800" dirty="0" err="1" smtClean="0">
+                          <a:solidFill>
+                            <a:srgbClr val="183691"/>
+                          </a:solidFill>
+                          <a:effectLst/>
+                          <a:latin typeface="Consolas" panose="020B0609020204030204" pitchFamily="49" charset="0"/>
+                        </a:rPr>
+                        <a:t>eric.weitz@nih.gov</a:t>
+                      </a:r>
+                      <a:r>
+                        <a:rPr lang="en-US" sz="1800" dirty="0" smtClean="0">
+                          <a:solidFill>
+                            <a:srgbClr val="183691"/>
+                          </a:solidFill>
+                          <a:effectLst/>
+                          <a:latin typeface="Consolas" panose="020B0609020204030204" pitchFamily="49" charset="0"/>
+                        </a:rPr>
+                        <a:t>'</a:t>
+                      </a:r>
+                      <a:r>
+                        <a:rPr lang="en-US" sz="1800" dirty="0" smtClean="0">
                           <a:solidFill>
                             <a:srgbClr val="333333"/>
                           </a:solidFill>
@@ -9146,6 +9170,13 @@
                         </a:rPr>
                         <a:t>;</a:t>
                       </a:r>
+                      <a:endParaRPr lang="en-US" sz="1800" dirty="0">
+                        <a:solidFill>
+                          <a:srgbClr val="333333"/>
+                        </a:solidFill>
+                        <a:effectLst/>
+                        <a:latin typeface="Consolas" panose="020B0609020204030204" pitchFamily="49" charset="0"/>
+                      </a:endParaRPr>
                     </a:p>
                     <a:p>
                       <a:pPr fontAlgn="t"/>
@@ -10446,7 +10477,7 @@
                         <a:t>'?</a:t>
                       </a:r>
                       <a:r>
-                        <a:rPr lang="en-US" sz="1400" dirty="0" err="1">
+                        <a:rPr lang="en-US" sz="1400" dirty="0" err="1" smtClean="0">
                           <a:solidFill>
                             <a:srgbClr val="183691"/>
                           </a:solidFill>
@@ -10456,7 +10487,7 @@
                         <a:t>retmode</a:t>
                       </a:r>
                       <a:r>
-                        <a:rPr lang="en-US" sz="1400" dirty="0">
+                        <a:rPr lang="en-US" sz="1400" dirty="0" smtClean="0">
                           <a:solidFill>
                             <a:srgbClr val="183691"/>
                           </a:solidFill>
@@ -10466,7 +10497,7 @@
                         <a:t>=</a:t>
                       </a:r>
                       <a:r>
-                        <a:rPr lang="en-US" sz="1400" dirty="0" err="1">
+                        <a:rPr lang="en-US" sz="1400" dirty="0" err="1" smtClean="0">
                           <a:solidFill>
                             <a:srgbClr val="183691"/>
                           </a:solidFill>
@@ -10476,17 +10507,57 @@
                         <a:t>json&amp;db</a:t>
                       </a:r>
                       <a:r>
-                        <a:rPr lang="en-US" sz="1400" dirty="0">
+                        <a:rPr lang="en-US" sz="1400" dirty="0" smtClean="0">
                           <a:solidFill>
                             <a:srgbClr val="183691"/>
                           </a:solidFill>
                           <a:effectLst/>
                           <a:latin typeface="Consolas" panose="020B0609020204030204" pitchFamily="49" charset="0"/>
                         </a:rPr>
-                        <a:t>=gene'</a:t>
-                      </a:r>
-                      <a:r>
-                        <a:rPr lang="en-US" sz="1400" dirty="0">
+                        <a:t>=</a:t>
+                      </a:r>
+                      <a:r>
+                        <a:rPr lang="en-US" sz="1400" dirty="0" err="1" smtClean="0">
+                          <a:solidFill>
+                            <a:srgbClr val="183691"/>
+                          </a:solidFill>
+                          <a:effectLst/>
+                          <a:latin typeface="Consolas" panose="020B0609020204030204" pitchFamily="49" charset="0"/>
+                        </a:rPr>
+                        <a:t>gene&amp;email</a:t>
+                      </a:r>
+                      <a:r>
+                        <a:rPr lang="en-US" sz="1400" dirty="0" smtClean="0">
+                          <a:solidFill>
+                            <a:srgbClr val="183691"/>
+                          </a:solidFill>
+                          <a:effectLst/>
+                          <a:latin typeface="Consolas" panose="020B0609020204030204" pitchFamily="49" charset="0"/>
+                        </a:rPr>
+                        <a:t>=</a:t>
+                      </a:r>
+                      <a:r>
+                        <a:rPr lang="en-US" sz="1400" dirty="0" err="1" smtClean="0">
+                          <a:solidFill>
+                            <a:srgbClr val="183691"/>
+                          </a:solidFill>
+                          <a:effectLst/>
+                          <a:latin typeface="Consolas" panose="020B0609020204030204" pitchFamily="49" charset="0"/>
+                        </a:rPr>
+                        <a:t>eric.weitz@nih.gov</a:t>
+                      </a:r>
+                      <a:r>
+                        <a:rPr lang="en-US" sz="1400" dirty="0" smtClean="0">
+                          <a:solidFill>
+                            <a:srgbClr val="183691"/>
+                          </a:solidFill>
+                          <a:effectLst/>
+                          <a:latin typeface="Consolas" panose="020B0609020204030204" pitchFamily="49" charset="0"/>
+                        </a:rPr>
+                        <a:t>'</a:t>
+                      </a:r>
+                      <a:r>
+                        <a:rPr lang="en-US" sz="1400" dirty="0" smtClean="0">
                           <a:solidFill>
                             <a:srgbClr val="333333"/>
                           </a:solidFill>
@@ -10495,6 +10566,13 @@
                         </a:rPr>
                         <a:t>;</a:t>
                       </a:r>
+                      <a:endParaRPr lang="en-US" sz="1400" dirty="0">
+                        <a:solidFill>
+                          <a:srgbClr val="333333"/>
+                        </a:solidFill>
+                        <a:effectLst/>
+                        <a:latin typeface="Consolas" panose="020B0609020204030204" pitchFamily="49" charset="0"/>
+                      </a:endParaRPr>
                     </a:p>
                     <a:p>
                       <a:pPr fontAlgn="t"/>
@@ -11683,17 +11761,27 @@
                         <a:t>].</a:t>
                       </a:r>
                       <a:r>
-                        <a:rPr lang="en-US" sz="1400" smtClean="0">
-                          <a:solidFill>
-                            <a:srgbClr val="333333"/>
-                          </a:solidFill>
-                          <a:effectLst/>
-                          <a:latin typeface="Consolas" panose="020B0609020204030204" pitchFamily="49" charset="0"/>
-                        </a:rPr>
-                        <a:t>genomicinfo[</a:t>
-                      </a:r>
-                      <a:r>
-                        <a:rPr lang="en-US" sz="1400" smtClean="0">
+                        <a:rPr lang="en-US" sz="1400" dirty="0" err="1" smtClean="0">
+                          <a:solidFill>
+                            <a:srgbClr val="333333"/>
+                          </a:solidFill>
+                          <a:effectLst/>
+                          <a:latin typeface="Consolas" panose="020B0609020204030204" pitchFamily="49" charset="0"/>
+                        </a:rPr>
+                        <a:t>genomicinfo</a:t>
+                      </a:r>
+                      <a:r>
+                        <a:rPr lang="en-US" sz="1400" dirty="0" smtClean="0">
+                          <a:solidFill>
+                            <a:srgbClr val="333333"/>
+                          </a:solidFill>
+                          <a:effectLst/>
+                          <a:latin typeface="Consolas" panose="020B0609020204030204" pitchFamily="49" charset="0"/>
+                        </a:rPr>
+                        <a:t>[</a:t>
+                      </a:r>
+                      <a:r>
+                        <a:rPr lang="en-US" sz="1400" dirty="0" smtClean="0">
                           <a:solidFill>
                             <a:srgbClr val="0086B3"/>
                           </a:solidFill>
@@ -12495,7 +12583,7 @@
                         <a:t>'?</a:t>
                       </a:r>
                       <a:r>
-                        <a:rPr lang="en-US" sz="1200" dirty="0" err="1">
+                        <a:rPr lang="en-US" sz="1200" dirty="0" err="1" smtClean="0">
                           <a:solidFill>
                             <a:srgbClr val="183691"/>
                           </a:solidFill>
@@ -12505,7 +12593,7 @@
                         <a:t>retmode</a:t>
                       </a:r>
                       <a:r>
-                        <a:rPr lang="en-US" sz="1200" dirty="0">
+                        <a:rPr lang="en-US" sz="1200" dirty="0" smtClean="0">
                           <a:solidFill>
                             <a:srgbClr val="183691"/>
                           </a:solidFill>
@@ -12515,7 +12603,7 @@
                         <a:t>=</a:t>
                       </a:r>
                       <a:r>
-                        <a:rPr lang="en-US" sz="1200" dirty="0" err="1">
+                        <a:rPr lang="en-US" sz="1200" dirty="0" err="1" smtClean="0">
                           <a:solidFill>
                             <a:srgbClr val="183691"/>
                           </a:solidFill>
@@ -12525,17 +12613,57 @@
                         <a:t>json&amp;db</a:t>
                       </a:r>
                       <a:r>
-                        <a:rPr lang="en-US" sz="1200" dirty="0">
+                        <a:rPr lang="en-US" sz="1200" dirty="0" smtClean="0">
                           <a:solidFill>
                             <a:srgbClr val="183691"/>
                           </a:solidFill>
                           <a:effectLst/>
                           <a:latin typeface="Consolas" panose="020B0609020204030204" pitchFamily="49" charset="0"/>
                         </a:rPr>
-                        <a:t>=gene'</a:t>
-                      </a:r>
-                      <a:r>
-                        <a:rPr lang="en-US" sz="1200" dirty="0">
+                        <a:t>=</a:t>
+                      </a:r>
+                      <a:r>
+                        <a:rPr lang="en-US" sz="1200" dirty="0" err="1" smtClean="0">
+                          <a:solidFill>
+                            <a:srgbClr val="183691"/>
+                          </a:solidFill>
+                          <a:effectLst/>
+                          <a:latin typeface="Consolas" panose="020B0609020204030204" pitchFamily="49" charset="0"/>
+                        </a:rPr>
+                        <a:t>gene&amp;email</a:t>
+                      </a:r>
+                      <a:r>
+                        <a:rPr lang="en-US" sz="1200" dirty="0" smtClean="0">
+                          <a:solidFill>
+                            <a:srgbClr val="183691"/>
+                          </a:solidFill>
+                          <a:effectLst/>
+                          <a:latin typeface="Consolas" panose="020B0609020204030204" pitchFamily="49" charset="0"/>
+                        </a:rPr>
+                        <a:t>=</a:t>
+                      </a:r>
+                      <a:r>
+                        <a:rPr lang="en-US" sz="1200" dirty="0" err="1" smtClean="0">
+                          <a:solidFill>
+                            <a:srgbClr val="183691"/>
+                          </a:solidFill>
+                          <a:effectLst/>
+                          <a:latin typeface="Consolas" panose="020B0609020204030204" pitchFamily="49" charset="0"/>
+                        </a:rPr>
+                        <a:t>eric.weitz@nih.gov</a:t>
+                      </a:r>
+                      <a:r>
+                        <a:rPr lang="en-US" sz="1200" dirty="0" smtClean="0">
+                          <a:solidFill>
+                            <a:srgbClr val="183691"/>
+                          </a:solidFill>
+                          <a:effectLst/>
+                          <a:latin typeface="Consolas" panose="020B0609020204030204" pitchFamily="49" charset="0"/>
+                        </a:rPr>
+                        <a:t>'</a:t>
+                      </a:r>
+                      <a:r>
+                        <a:rPr lang="en-US" sz="1200" dirty="0" smtClean="0">
                           <a:solidFill>
                             <a:srgbClr val="333333"/>
                           </a:solidFill>
@@ -12544,6 +12672,13 @@
                         </a:rPr>
                         <a:t>;</a:t>
                       </a:r>
+                      <a:endParaRPr lang="en-US" sz="1200" dirty="0">
+                        <a:solidFill>
+                          <a:srgbClr val="333333"/>
+                        </a:solidFill>
+                        <a:effectLst/>
+                        <a:latin typeface="Consolas" panose="020B0609020204030204" pitchFamily="49" charset="0"/>
+                      </a:endParaRPr>
                     </a:p>
                     <a:p>
                       <a:pPr fontAlgn="t"/>
@@ -15028,15 +15163,31 @@
             </a:r>
             <a:r>
               <a:rPr lang="en-US" dirty="0" smtClean="0"/>
-              <a:t> (Windows: Ctrl Shift I, Mac: </a:t>
+              <a:t> (Windows: </a:t>
+            </a:r>
+            <a:r>
+              <a:rPr lang="en-US" smtClean="0"/>
+              <a:t>Ctrl+Shift+I</a:t>
+            </a:r>
+            <a:r>
+              <a:rPr lang="en-US" dirty="0" smtClean="0"/>
+              <a:t>, Mac: </a:t>
             </a:r>
             <a:r>
               <a:rPr lang="en-US" dirty="0" err="1" smtClean="0"/>
               <a:t>Cmd</a:t>
             </a:r>
             <a:r>
+              <a:rPr lang="en-US" dirty="0" err="1"/>
+              <a:t>+</a:t>
+            </a:r>
+            <a:r>
+              <a:rPr lang="en-US" dirty="0" err="1" smtClean="0"/>
+              <a:t>Opt+I</a:t>
+            </a:r>
+            <a:r>
               <a:rPr lang="en-US" dirty="0" smtClean="0"/>
-              <a:t> Shift I)</a:t>
+              <a:t>)</a:t>
             </a:r>
           </a:p>
           <a:p>

</xml_diff>